<commit_message>
Add sample gui and realise sample sync then user click open file button
</commit_message>
<xml_diff>
--- a/Documentation/aboutClasses.pptx
+++ b/Documentation/aboutClasses.pptx
@@ -6,8 +6,10 @@
   </p:sldMasterIdLst>
   <p:sldIdLst>
     <p:sldId id="256" r:id="rId2"/>
-    <p:sldId id="257" r:id="rId3"/>
-    <p:sldId id="258" r:id="rId4"/>
+    <p:sldId id="259" r:id="rId3"/>
+    <p:sldId id="257" r:id="rId4"/>
+    <p:sldId id="258" r:id="rId5"/>
+    <p:sldId id="260" r:id="rId6"/>
   </p:sldIdLst>
   <p:sldSz cx="9144000" cy="6858000" type="screen4x3"/>
   <p:notesSz cx="6858000" cy="9144000"/>
@@ -1103,6 +1105,13 @@
         </dgm:presLayoutVars>
       </dgm:prSet>
       <dgm:spPr/>
+      <dgm:t>
+        <a:bodyPr/>
+        <a:lstStyle/>
+        <a:p>
+          <a:endParaRPr lang="ru-RU"/>
+        </a:p>
+      </dgm:t>
     </dgm:pt>
     <dgm:pt modelId="{B85299F0-294F-4219-B901-4B03F31D529B}" type="pres">
       <dgm:prSet presAssocID="{252AA710-05AD-4B61-A2F3-197705EA7A56}" presName="hierRoot1" presStyleCnt="0"/>
@@ -1138,6 +1147,13 @@
     <dgm:pt modelId="{B43E4DE4-1A29-411C-9435-A0C57FF3D538}" type="pres">
       <dgm:prSet presAssocID="{21BDCADB-DCF9-4F2B-B9F0-296123E7F07E}" presName="Name10" presStyleLbl="parChTrans1D2" presStyleIdx="0" presStyleCnt="3"/>
       <dgm:spPr/>
+      <dgm:t>
+        <a:bodyPr/>
+        <a:lstStyle/>
+        <a:p>
+          <a:endParaRPr lang="ru-RU"/>
+        </a:p>
+      </dgm:t>
     </dgm:pt>
     <dgm:pt modelId="{57DE2FC1-3291-49A8-A1B8-8D63C660483F}" type="pres">
       <dgm:prSet presAssocID="{015CFE04-97E5-42B3-ACBC-0F5ADE1BC827}" presName="hierRoot2" presStyleCnt="0"/>
@@ -1173,6 +1189,13 @@
     <dgm:pt modelId="{A23CA32F-8111-47F7-B9B3-CDC4A58E6A94}" type="pres">
       <dgm:prSet presAssocID="{C2CB0D3E-35F3-4898-A854-DF2DC54FCC77}" presName="Name17" presStyleLbl="parChTrans1D3" presStyleIdx="0" presStyleCnt="2"/>
       <dgm:spPr/>
+      <dgm:t>
+        <a:bodyPr/>
+        <a:lstStyle/>
+        <a:p>
+          <a:endParaRPr lang="ru-RU"/>
+        </a:p>
+      </dgm:t>
     </dgm:pt>
     <dgm:pt modelId="{9FF17FA4-81A6-4A88-B37A-28031F69F399}" type="pres">
       <dgm:prSet presAssocID="{0AC66B6E-C435-45CD-B0B1-492F0843C201}" presName="hierRoot3" presStyleCnt="0"/>
@@ -1208,6 +1231,13 @@
     <dgm:pt modelId="{A43E1597-C8F5-46EA-A601-7AC3F4AE26E7}" type="pres">
       <dgm:prSet presAssocID="{1BCE158B-E47D-4F54-A78F-5319EFAD543E}" presName="Name17" presStyleLbl="parChTrans1D3" presStyleIdx="1" presStyleCnt="2"/>
       <dgm:spPr/>
+      <dgm:t>
+        <a:bodyPr/>
+        <a:lstStyle/>
+        <a:p>
+          <a:endParaRPr lang="ru-RU"/>
+        </a:p>
+      </dgm:t>
     </dgm:pt>
     <dgm:pt modelId="{307413A4-4CC7-4E1C-89F6-68DC9E718700}" type="pres">
       <dgm:prSet presAssocID="{6677E345-29FD-4796-8848-61D55602E4B3}" presName="hierRoot3" presStyleCnt="0"/>
@@ -1243,6 +1273,13 @@
     <dgm:pt modelId="{1B28E523-F73F-45EC-9B46-A48CA57CA31E}" type="pres">
       <dgm:prSet presAssocID="{2305217A-66B2-4F08-B512-688760A8D46C}" presName="Name10" presStyleLbl="parChTrans1D2" presStyleIdx="1" presStyleCnt="3"/>
       <dgm:spPr/>
+      <dgm:t>
+        <a:bodyPr/>
+        <a:lstStyle/>
+        <a:p>
+          <a:endParaRPr lang="ru-RU"/>
+        </a:p>
+      </dgm:t>
     </dgm:pt>
     <dgm:pt modelId="{AA9CD136-8E6A-4455-BECA-B0166636C7D3}" type="pres">
       <dgm:prSet presAssocID="{207E93FE-5D75-4356-A2A4-BF47E3568291}" presName="hierRoot2" presStyleCnt="0"/>
@@ -1278,6 +1315,13 @@
     <dgm:pt modelId="{45BFF0A3-853A-46CF-A7A6-1B83EDBBAA62}" type="pres">
       <dgm:prSet presAssocID="{A17E465C-964B-4E28-BF1F-5304945DCE8D}" presName="Name10" presStyleLbl="parChTrans1D2" presStyleIdx="2" presStyleCnt="3"/>
       <dgm:spPr/>
+      <dgm:t>
+        <a:bodyPr/>
+        <a:lstStyle/>
+        <a:p>
+          <a:endParaRPr lang="ru-RU"/>
+        </a:p>
+      </dgm:t>
     </dgm:pt>
     <dgm:pt modelId="{55E15888-F6CC-49C0-8538-82A35D6AA6A3}" type="pres">
       <dgm:prSet presAssocID="{E098A20D-C4F3-4D7D-A950-9EA05C230458}" presName="hierRoot2" presStyleCnt="0"/>
@@ -1328,8 +1372,8 @@
     <dgm:cxn modelId="{53C1DBA1-74F5-4DEB-A029-D74C544B4C6A}" type="presOf" srcId="{1BCE158B-E47D-4F54-A78F-5319EFAD543E}" destId="{A43E1597-C8F5-46EA-A601-7AC3F4AE26E7}" srcOrd="0" destOrd="0" presId="urn:microsoft.com/office/officeart/2009/layout/CirclePictureHierarchy"/>
     <dgm:cxn modelId="{5F0804F8-4BEB-40B6-B0DA-B17C3614141D}" type="presOf" srcId="{252AA710-05AD-4B61-A2F3-197705EA7A56}" destId="{681B68B3-A0A0-4181-B32C-17F6B133EC9F}" srcOrd="0" destOrd="0" presId="urn:microsoft.com/office/officeart/2009/layout/CirclePictureHierarchy"/>
     <dgm:cxn modelId="{18F22A2E-C403-4BEB-B312-0BE80A757215}" srcId="{252AA710-05AD-4B61-A2F3-197705EA7A56}" destId="{015CFE04-97E5-42B3-ACBC-0F5ADE1BC827}" srcOrd="0" destOrd="0" parTransId="{21BDCADB-DCF9-4F2B-B9F0-296123E7F07E}" sibTransId="{DD51167A-4246-40DC-9650-E2A840A9EBE2}"/>
+    <dgm:cxn modelId="{2FB62D71-2E5A-43AB-8B01-7B592753D266}" type="presOf" srcId="{E82DAA7A-7711-4249-AC42-9F376A21BB53}" destId="{C26FE7BD-B8E4-4B34-81F4-9460C676FDAE}" srcOrd="0" destOrd="0" presId="urn:microsoft.com/office/officeart/2009/layout/CirclePictureHierarchy"/>
     <dgm:cxn modelId="{4C0CC61E-996A-45C4-B676-643CADB822E2}" srcId="{252AA710-05AD-4B61-A2F3-197705EA7A56}" destId="{E098A20D-C4F3-4D7D-A950-9EA05C230458}" srcOrd="2" destOrd="0" parTransId="{A17E465C-964B-4E28-BF1F-5304945DCE8D}" sibTransId="{E5822D00-A1E9-4E2F-A430-1A463DE2EECF}"/>
-    <dgm:cxn modelId="{2FB62D71-2E5A-43AB-8B01-7B592753D266}" type="presOf" srcId="{E82DAA7A-7711-4249-AC42-9F376A21BB53}" destId="{C26FE7BD-B8E4-4B34-81F4-9460C676FDAE}" srcOrd="0" destOrd="0" presId="urn:microsoft.com/office/officeart/2009/layout/CirclePictureHierarchy"/>
     <dgm:cxn modelId="{6B7E0C3E-4FDC-4452-9572-DDBB79DB18A5}" type="presParOf" srcId="{C26FE7BD-B8E4-4B34-81F4-9460C676FDAE}" destId="{B85299F0-294F-4219-B901-4B03F31D529B}" srcOrd="0" destOrd="0" presId="urn:microsoft.com/office/officeart/2009/layout/CirclePictureHierarchy"/>
     <dgm:cxn modelId="{B34D424F-4DC9-41A5-8544-FD14472A4594}" type="presParOf" srcId="{B85299F0-294F-4219-B901-4B03F31D529B}" destId="{3BE2D8C9-FFC5-44F8-ACF7-68322C04B97D}" srcOrd="0" destOrd="0" presId="urn:microsoft.com/office/officeart/2009/layout/CirclePictureHierarchy"/>
     <dgm:cxn modelId="{E6AFFA9D-D5E0-4658-B261-E325A213314F}" type="presParOf" srcId="{3BE2D8C9-FFC5-44F8-ACF7-68322C04B97D}" destId="{CFA32084-ACBB-4830-B315-DD8A70D3E7BB}" srcOrd="0" destOrd="0" presId="urn:microsoft.com/office/officeart/2009/layout/CirclePictureHierarchy"/>
@@ -5748,7 +5792,7 @@
           <a:p>
             <a:fld id="{EEC29AEC-8047-4BDA-97D7-D38AC62176F2}" type="datetimeFigureOut">
               <a:rPr lang="ru-RU" smtClean="0"/>
-              <a:t>13.09.2016</a:t>
+              <a:t>14.09.2016</a:t>
             </a:fld>
             <a:endParaRPr lang="ru-RU"/>
           </a:p>
@@ -5929,7 +5973,7 @@
           <a:p>
             <a:fld id="{EEC29AEC-8047-4BDA-97D7-D38AC62176F2}" type="datetimeFigureOut">
               <a:rPr lang="ru-RU" smtClean="0"/>
-              <a:t>13.09.2016</a:t>
+              <a:t>14.09.2016</a:t>
             </a:fld>
             <a:endParaRPr lang="ru-RU"/>
           </a:p>
@@ -6080,7 +6124,7 @@
           <a:p>
             <a:fld id="{EEC29AEC-8047-4BDA-97D7-D38AC62176F2}" type="datetimeFigureOut">
               <a:rPr lang="ru-RU" smtClean="0"/>
-              <a:t>13.09.2016</a:t>
+              <a:t>14.09.2016</a:t>
             </a:fld>
             <a:endParaRPr lang="ru-RU"/>
           </a:p>
@@ -7906,7 +7950,7 @@
           <a:p>
             <a:fld id="{EEC29AEC-8047-4BDA-97D7-D38AC62176F2}" type="datetimeFigureOut">
               <a:rPr lang="ru-RU" smtClean="0"/>
-              <a:t>13.09.2016</a:t>
+              <a:t>14.09.2016</a:t>
             </a:fld>
             <a:endParaRPr lang="ru-RU"/>
           </a:p>
@@ -9776,7 +9820,7 @@
           <a:p>
             <a:fld id="{EEC29AEC-8047-4BDA-97D7-D38AC62176F2}" type="datetimeFigureOut">
               <a:rPr lang="ru-RU" smtClean="0"/>
-              <a:t>13.09.2016</a:t>
+              <a:t>14.09.2016</a:t>
             </a:fld>
             <a:endParaRPr lang="ru-RU"/>
           </a:p>
@@ -9889,7 +9933,7 @@
           <a:p>
             <a:fld id="{EEC29AEC-8047-4BDA-97D7-D38AC62176F2}" type="datetimeFigureOut">
               <a:rPr lang="ru-RU" smtClean="0"/>
-              <a:t>13.09.2016</a:t>
+              <a:t>14.09.2016</a:t>
             </a:fld>
             <a:endParaRPr lang="ru-RU"/>
           </a:p>
@@ -10430,7 +10474,7 @@
           <a:p>
             <a:fld id="{EEC29AEC-8047-4BDA-97D7-D38AC62176F2}" type="datetimeFigureOut">
               <a:rPr lang="ru-RU" smtClean="0"/>
-              <a:t>13.09.2016</a:t>
+              <a:t>14.09.2016</a:t>
             </a:fld>
             <a:endParaRPr lang="ru-RU"/>
           </a:p>
@@ -10543,7 +10587,7 @@
           <a:p>
             <a:fld id="{EEC29AEC-8047-4BDA-97D7-D38AC62176F2}" type="datetimeFigureOut">
               <a:rPr lang="ru-RU" smtClean="0"/>
-              <a:t>13.09.2016</a:t>
+              <a:t>14.09.2016</a:t>
             </a:fld>
             <a:endParaRPr lang="ru-RU"/>
           </a:p>
@@ -12254,7 +12298,7 @@
           <a:p>
             <a:fld id="{EEC29AEC-8047-4BDA-97D7-D38AC62176F2}" type="datetimeFigureOut">
               <a:rPr lang="ru-RU" smtClean="0"/>
-              <a:t>13.09.2016</a:t>
+              <a:t>14.09.2016</a:t>
             </a:fld>
             <a:endParaRPr lang="ru-RU"/>
           </a:p>
@@ -12405,7 +12449,7 @@
           <a:p>
             <a:fld id="{EEC29AEC-8047-4BDA-97D7-D38AC62176F2}" type="datetimeFigureOut">
               <a:rPr lang="ru-RU" smtClean="0"/>
-              <a:t>13.09.2016</a:t>
+              <a:t>14.09.2016</a:t>
             </a:fld>
             <a:endParaRPr lang="ru-RU"/>
           </a:p>
@@ -16020,7 +16064,7 @@
           <a:p>
             <a:fld id="{EEC29AEC-8047-4BDA-97D7-D38AC62176F2}" type="datetimeFigureOut">
               <a:rPr lang="ru-RU" smtClean="0"/>
-              <a:t>13.09.2016</a:t>
+              <a:t>14.09.2016</a:t>
             </a:fld>
             <a:endParaRPr lang="ru-RU"/>
           </a:p>
@@ -17879,7 +17923,7 @@
           <a:p>
             <a:fld id="{EEC29AEC-8047-4BDA-97D7-D38AC62176F2}" type="datetimeFigureOut">
               <a:rPr lang="ru-RU" smtClean="0"/>
-              <a:t>13.09.2016</a:t>
+              <a:t>14.09.2016</a:t>
             </a:fld>
             <a:endParaRPr lang="ru-RU"/>
           </a:p>
@@ -18395,6 +18439,112 @@
           <a:chExt cx="0" cy="0"/>
         </a:xfrm>
       </p:grpSpPr>
+      <p:sp>
+        <p:nvSpPr>
+          <p:cNvPr id="3" name="Заголовок 2"/>
+          <p:cNvSpPr txBox="1">
+            <a:spLocks/>
+          </p:cNvSpPr>
+          <p:nvPr/>
+        </p:nvSpPr>
+        <p:spPr>
+          <a:xfrm>
+            <a:off x="457200" y="338328"/>
+            <a:ext cx="8229600" cy="1252728"/>
+          </a:xfrm>
+          <a:prstGeom prst="rect">
+            <a:avLst/>
+          </a:prstGeom>
+        </p:spPr>
+        <p:txBody>
+          <a:bodyPr vert="horz" lIns="91440" tIns="45720" rIns="91440" bIns="45720" rtlCol="0" anchor="b">
+            <a:normAutofit/>
+          </a:bodyPr>
+          <a:lstStyle>
+            <a:lvl1pPr algn="ctr" defTabSz="914400" rtl="0" eaLnBrk="1" latinLnBrk="0" hangingPunct="1">
+              <a:spcBef>
+                <a:spcPct val="0"/>
+              </a:spcBef>
+              <a:buNone/>
+              <a:defRPr sz="4400" kern="1200">
+                <a:solidFill>
+                  <a:srgbClr val="FFFFFF"/>
+                </a:solidFill>
+                <a:latin typeface="+mj-lt"/>
+                <a:ea typeface="+mj-ea"/>
+                <a:cs typeface="+mj-cs"/>
+              </a:defRPr>
+            </a:lvl1pPr>
+            <a:lvl2pPr eaLnBrk="1" hangingPunct="1">
+              <a:defRPr>
+                <a:solidFill>
+                  <a:schemeClr val="tx2"/>
+                </a:solidFill>
+              </a:defRPr>
+            </a:lvl2pPr>
+            <a:lvl3pPr eaLnBrk="1" hangingPunct="1">
+              <a:defRPr>
+                <a:solidFill>
+                  <a:schemeClr val="tx2"/>
+                </a:solidFill>
+              </a:defRPr>
+            </a:lvl3pPr>
+            <a:lvl4pPr eaLnBrk="1" hangingPunct="1">
+              <a:defRPr>
+                <a:solidFill>
+                  <a:schemeClr val="tx2"/>
+                </a:solidFill>
+              </a:defRPr>
+            </a:lvl4pPr>
+            <a:lvl5pPr eaLnBrk="1" hangingPunct="1">
+              <a:defRPr>
+                <a:solidFill>
+                  <a:schemeClr val="tx2"/>
+                </a:solidFill>
+              </a:defRPr>
+            </a:lvl5pPr>
+            <a:lvl6pPr eaLnBrk="1" hangingPunct="1">
+              <a:defRPr>
+                <a:solidFill>
+                  <a:schemeClr val="tx2"/>
+                </a:solidFill>
+              </a:defRPr>
+            </a:lvl6pPr>
+            <a:lvl7pPr eaLnBrk="1" hangingPunct="1">
+              <a:defRPr>
+                <a:solidFill>
+                  <a:schemeClr val="tx2"/>
+                </a:solidFill>
+              </a:defRPr>
+            </a:lvl7pPr>
+            <a:lvl8pPr eaLnBrk="1" hangingPunct="1">
+              <a:defRPr>
+                <a:solidFill>
+                  <a:schemeClr val="tx2"/>
+                </a:solidFill>
+              </a:defRPr>
+            </a:lvl8pPr>
+            <a:lvl9pPr eaLnBrk="1" hangingPunct="1">
+              <a:defRPr>
+                <a:solidFill>
+                  <a:schemeClr val="tx2"/>
+                </a:solidFill>
+              </a:defRPr>
+            </a:lvl9pPr>
+          </a:lstStyle>
+          <a:p>
+            <a:r>
+              <a:rPr lang="ru-RU" dirty="0" smtClean="0"/>
+              <a:t>Проект </a:t>
+            </a:r>
+            <a:r>
+              <a:rPr lang="en-US" dirty="0" err="1" smtClean="0"/>
+              <a:t>eduEnReader</a:t>
+            </a:r>
+            <a:endParaRPr lang="ru-RU" dirty="0"/>
+          </a:p>
+        </p:txBody>
+      </p:sp>
     </p:spTree>
     <p:extLst>
       <p:ext uri="{BB962C8B-B14F-4D97-AF65-F5344CB8AC3E}">
@@ -18416,6 +18566,1253 @@
 </file>
 
 <file path=ppt/slides/slide2.xml><?xml version="1.0" encoding="utf-8"?>
+<p:sld xmlns:a="http://schemas.openxmlformats.org/drawingml/2006/main" xmlns:r="http://schemas.openxmlformats.org/officeDocument/2006/relationships" xmlns:p="http://schemas.openxmlformats.org/presentationml/2006/main">
+  <p:cSld>
+    <p:spTree>
+      <p:nvGrpSpPr>
+        <p:cNvPr id="1" name=""/>
+        <p:cNvGrpSpPr/>
+        <p:nvPr/>
+      </p:nvGrpSpPr>
+      <p:grpSpPr>
+        <a:xfrm>
+          <a:off x="0" y="0"/>
+          <a:ext cx="0" cy="0"/>
+          <a:chOff x="0" y="0"/>
+          <a:chExt cx="0" cy="0"/>
+        </a:xfrm>
+      </p:grpSpPr>
+      <p:sp>
+        <p:nvSpPr>
+          <p:cNvPr id="3" name="Заголовок 2"/>
+          <p:cNvSpPr>
+            <a:spLocks noGrp="1"/>
+          </p:cNvSpPr>
+          <p:nvPr>
+            <p:ph type="title"/>
+          </p:nvPr>
+        </p:nvSpPr>
+        <p:spPr/>
+        <p:txBody>
+          <a:bodyPr/>
+          <a:lstStyle/>
+          <a:p>
+            <a:r>
+              <a:rPr lang="en-US" dirty="0" smtClean="0"/>
+              <a:t>Use case</a:t>
+            </a:r>
+            <a:r>
+              <a:rPr lang="ru-RU" dirty="0" smtClean="0"/>
+              <a:t> </a:t>
+            </a:r>
+            <a:r>
+              <a:rPr lang="en-US" dirty="0" smtClean="0"/>
+              <a:t>v 1.0</a:t>
+            </a:r>
+            <a:endParaRPr lang="ru-RU" dirty="0"/>
+          </a:p>
+        </p:txBody>
+      </p:sp>
+      <p:sp>
+        <p:nvSpPr>
+          <p:cNvPr id="4" name="Улыбающееся лицо 3"/>
+          <p:cNvSpPr/>
+          <p:nvPr/>
+        </p:nvSpPr>
+        <p:spPr>
+          <a:xfrm>
+            <a:off x="503981" y="5085184"/>
+            <a:ext cx="1008112" cy="1008112"/>
+          </a:xfrm>
+          <a:prstGeom prst="smileyFace">
+            <a:avLst/>
+          </a:prstGeom>
+        </p:spPr>
+        <p:style>
+          <a:lnRef idx="2">
+            <a:schemeClr val="accent1">
+              <a:shade val="50000"/>
+            </a:schemeClr>
+          </a:lnRef>
+          <a:fillRef idx="1">
+            <a:schemeClr val="accent1"/>
+          </a:fillRef>
+          <a:effectRef idx="0">
+            <a:schemeClr val="accent1"/>
+          </a:effectRef>
+          <a:fontRef idx="minor">
+            <a:schemeClr val="lt1"/>
+          </a:fontRef>
+        </p:style>
+        <p:txBody>
+          <a:bodyPr rtlCol="0" anchor="ctr"/>
+          <a:lstStyle/>
+          <a:p>
+            <a:pPr algn="ctr"/>
+            <a:endParaRPr lang="ru-RU"/>
+          </a:p>
+        </p:txBody>
+      </p:sp>
+      <p:cxnSp>
+        <p:nvCxnSpPr>
+          <p:cNvPr id="6" name="Прямая со стрелкой 5"/>
+          <p:cNvCxnSpPr>
+            <a:stCxn id="4" idx="7"/>
+            <a:endCxn id="11" idx="3"/>
+          </p:cNvCxnSpPr>
+          <p:nvPr/>
+        </p:nvCxnSpPr>
+        <p:spPr>
+          <a:xfrm flipV="1">
+            <a:off x="1364458" y="4526232"/>
+            <a:ext cx="455953" cy="706587"/>
+          </a:xfrm>
+          <a:prstGeom prst="straightConnector1">
+            <a:avLst/>
+          </a:prstGeom>
+          <a:ln>
+            <a:tailEnd type="arrow"/>
+          </a:ln>
+        </p:spPr>
+        <p:style>
+          <a:lnRef idx="1">
+            <a:schemeClr val="accent1"/>
+          </a:lnRef>
+          <a:fillRef idx="0">
+            <a:schemeClr val="accent1"/>
+          </a:fillRef>
+          <a:effectRef idx="0">
+            <a:schemeClr val="accent1"/>
+          </a:effectRef>
+          <a:fontRef idx="minor">
+            <a:schemeClr val="tx1"/>
+          </a:fontRef>
+        </p:style>
+      </p:cxnSp>
+      <p:cxnSp>
+        <p:nvCxnSpPr>
+          <p:cNvPr id="8" name="Прямая со стрелкой 7"/>
+          <p:cNvCxnSpPr>
+            <a:stCxn id="4" idx="6"/>
+            <a:endCxn id="12" idx="2"/>
+          </p:cNvCxnSpPr>
+          <p:nvPr/>
+        </p:nvCxnSpPr>
+        <p:spPr>
+          <a:xfrm>
+            <a:off x="1512093" y="5589240"/>
+            <a:ext cx="300276" cy="177511"/>
+          </a:xfrm>
+          <a:prstGeom prst="straightConnector1">
+            <a:avLst/>
+          </a:prstGeom>
+          <a:ln>
+            <a:tailEnd type="arrow"/>
+          </a:ln>
+        </p:spPr>
+        <p:style>
+          <a:lnRef idx="1">
+            <a:schemeClr val="accent1"/>
+          </a:lnRef>
+          <a:fillRef idx="0">
+            <a:schemeClr val="accent1"/>
+          </a:fillRef>
+          <a:effectRef idx="0">
+            <a:schemeClr val="accent1"/>
+          </a:effectRef>
+          <a:fontRef idx="minor">
+            <a:schemeClr val="tx1"/>
+          </a:fontRef>
+        </p:style>
+      </p:cxnSp>
+      <p:sp>
+        <p:nvSpPr>
+          <p:cNvPr id="11" name="Овал 10"/>
+          <p:cNvSpPr/>
+          <p:nvPr/>
+        </p:nvSpPr>
+        <p:spPr>
+          <a:xfrm>
+            <a:off x="1662231" y="3700347"/>
+            <a:ext cx="1080120" cy="967584"/>
+          </a:xfrm>
+          <a:prstGeom prst="ellipse">
+            <a:avLst/>
+          </a:prstGeom>
+        </p:spPr>
+        <p:style>
+          <a:lnRef idx="2">
+            <a:schemeClr val="accent1">
+              <a:shade val="50000"/>
+            </a:schemeClr>
+          </a:lnRef>
+          <a:fillRef idx="1">
+            <a:schemeClr val="accent1"/>
+          </a:fillRef>
+          <a:effectRef idx="0">
+            <a:schemeClr val="accent1"/>
+          </a:effectRef>
+          <a:fontRef idx="minor">
+            <a:schemeClr val="lt1"/>
+          </a:fontRef>
+        </p:style>
+        <p:txBody>
+          <a:bodyPr rtlCol="0" anchor="ctr"/>
+          <a:lstStyle/>
+          <a:p>
+            <a:pPr algn="ctr"/>
+            <a:r>
+              <a:rPr lang="en-US" dirty="0" smtClean="0"/>
+              <a:t>Edit</a:t>
+            </a:r>
+            <a:endParaRPr lang="ru-RU" dirty="0"/>
+          </a:p>
+        </p:txBody>
+      </p:sp>
+      <p:sp>
+        <p:nvSpPr>
+          <p:cNvPr id="12" name="Овал 11"/>
+          <p:cNvSpPr/>
+          <p:nvPr/>
+        </p:nvSpPr>
+        <p:spPr>
+          <a:xfrm>
+            <a:off x="1812369" y="5282959"/>
+            <a:ext cx="1080120" cy="967584"/>
+          </a:xfrm>
+          <a:prstGeom prst="ellipse">
+            <a:avLst/>
+          </a:prstGeom>
+        </p:spPr>
+        <p:style>
+          <a:lnRef idx="2">
+            <a:schemeClr val="accent1">
+              <a:shade val="50000"/>
+            </a:schemeClr>
+          </a:lnRef>
+          <a:fillRef idx="1">
+            <a:schemeClr val="accent1"/>
+          </a:fillRef>
+          <a:effectRef idx="0">
+            <a:schemeClr val="accent1"/>
+          </a:effectRef>
+          <a:fontRef idx="minor">
+            <a:schemeClr val="lt1"/>
+          </a:fontRef>
+        </p:style>
+        <p:txBody>
+          <a:bodyPr rtlCol="0" anchor="ctr"/>
+          <a:lstStyle/>
+          <a:p>
+            <a:pPr algn="ctr"/>
+            <a:r>
+              <a:rPr lang="en-US" dirty="0" smtClean="0"/>
+              <a:t>View</a:t>
+            </a:r>
+            <a:endParaRPr lang="ru-RU" dirty="0"/>
+          </a:p>
+        </p:txBody>
+      </p:sp>
+      <p:sp>
+        <p:nvSpPr>
+          <p:cNvPr id="17" name="Овал 16"/>
+          <p:cNvSpPr/>
+          <p:nvPr/>
+        </p:nvSpPr>
+        <p:spPr>
+          <a:xfrm>
+            <a:off x="3215554" y="2305461"/>
+            <a:ext cx="1537036" cy="914400"/>
+          </a:xfrm>
+          <a:prstGeom prst="ellipse">
+            <a:avLst/>
+          </a:prstGeom>
+        </p:spPr>
+        <p:style>
+          <a:lnRef idx="2">
+            <a:schemeClr val="accent1">
+              <a:shade val="50000"/>
+            </a:schemeClr>
+          </a:lnRef>
+          <a:fillRef idx="1">
+            <a:schemeClr val="accent1"/>
+          </a:fillRef>
+          <a:effectRef idx="0">
+            <a:schemeClr val="accent1"/>
+          </a:effectRef>
+          <a:fontRef idx="minor">
+            <a:schemeClr val="lt1"/>
+          </a:fontRef>
+        </p:style>
+        <p:txBody>
+          <a:bodyPr rtlCol="0" anchor="ctr"/>
+          <a:lstStyle/>
+          <a:p>
+            <a:pPr algn="ctr"/>
+            <a:r>
+              <a:rPr lang="en-US" dirty="0" smtClean="0"/>
+              <a:t>Select</a:t>
+            </a:r>
+            <a:r>
+              <a:rPr lang="ru-RU" dirty="0" smtClean="0"/>
+              <a:t> </a:t>
+            </a:r>
+            <a:r>
+              <a:rPr lang="en-US" dirty="0" smtClean="0"/>
+              <a:t>Sound</a:t>
+            </a:r>
+            <a:endParaRPr lang="ru-RU" dirty="0"/>
+          </a:p>
+        </p:txBody>
+      </p:sp>
+      <p:sp>
+        <p:nvSpPr>
+          <p:cNvPr id="18" name="Овал 17"/>
+          <p:cNvSpPr/>
+          <p:nvPr/>
+        </p:nvSpPr>
+        <p:spPr>
+          <a:xfrm>
+            <a:off x="3419872" y="3472304"/>
+            <a:ext cx="1423472" cy="914400"/>
+          </a:xfrm>
+          <a:prstGeom prst="ellipse">
+            <a:avLst/>
+          </a:prstGeom>
+        </p:spPr>
+        <p:style>
+          <a:lnRef idx="2">
+            <a:schemeClr val="accent1">
+              <a:shade val="50000"/>
+            </a:schemeClr>
+          </a:lnRef>
+          <a:fillRef idx="1">
+            <a:schemeClr val="accent1"/>
+          </a:fillRef>
+          <a:effectRef idx="0">
+            <a:schemeClr val="accent1"/>
+          </a:effectRef>
+          <a:fontRef idx="minor">
+            <a:schemeClr val="lt1"/>
+          </a:fontRef>
+        </p:style>
+        <p:txBody>
+          <a:bodyPr rtlCol="0" anchor="ctr"/>
+          <a:lstStyle/>
+          <a:p>
+            <a:pPr algn="ctr"/>
+            <a:r>
+              <a:rPr lang="en-US" dirty="0" smtClean="0"/>
+              <a:t>Select Text</a:t>
+            </a:r>
+            <a:endParaRPr lang="ru-RU" dirty="0"/>
+          </a:p>
+        </p:txBody>
+      </p:sp>
+      <p:cxnSp>
+        <p:nvCxnSpPr>
+          <p:cNvPr id="20" name="Прямая со стрелкой 19"/>
+          <p:cNvCxnSpPr>
+            <a:stCxn id="11" idx="7"/>
+            <a:endCxn id="17" idx="2"/>
+          </p:cNvCxnSpPr>
+          <p:nvPr/>
+        </p:nvCxnSpPr>
+        <p:spPr>
+          <a:xfrm flipV="1">
+            <a:off x="2584171" y="2762661"/>
+            <a:ext cx="631383" cy="1079385"/>
+          </a:xfrm>
+          <a:prstGeom prst="straightConnector1">
+            <a:avLst/>
+          </a:prstGeom>
+          <a:ln>
+            <a:tailEnd type="arrow"/>
+          </a:ln>
+        </p:spPr>
+        <p:style>
+          <a:lnRef idx="1">
+            <a:schemeClr val="accent1"/>
+          </a:lnRef>
+          <a:fillRef idx="0">
+            <a:schemeClr val="accent1"/>
+          </a:fillRef>
+          <a:effectRef idx="0">
+            <a:schemeClr val="accent1"/>
+          </a:effectRef>
+          <a:fontRef idx="minor">
+            <a:schemeClr val="tx1"/>
+          </a:fontRef>
+        </p:style>
+      </p:cxnSp>
+      <p:cxnSp>
+        <p:nvCxnSpPr>
+          <p:cNvPr id="22" name="Прямая со стрелкой 21"/>
+          <p:cNvCxnSpPr>
+            <a:stCxn id="11" idx="6"/>
+            <a:endCxn id="18" idx="2"/>
+          </p:cNvCxnSpPr>
+          <p:nvPr/>
+        </p:nvCxnSpPr>
+        <p:spPr>
+          <a:xfrm flipV="1">
+            <a:off x="2742351" y="3929504"/>
+            <a:ext cx="677521" cy="254635"/>
+          </a:xfrm>
+          <a:prstGeom prst="straightConnector1">
+            <a:avLst/>
+          </a:prstGeom>
+          <a:ln>
+            <a:tailEnd type="arrow"/>
+          </a:ln>
+        </p:spPr>
+        <p:style>
+          <a:lnRef idx="1">
+            <a:schemeClr val="accent1"/>
+          </a:lnRef>
+          <a:fillRef idx="0">
+            <a:schemeClr val="accent1"/>
+          </a:fillRef>
+          <a:effectRef idx="0">
+            <a:schemeClr val="accent1"/>
+          </a:effectRef>
+          <a:fontRef idx="minor">
+            <a:schemeClr val="tx1"/>
+          </a:fontRef>
+        </p:style>
+      </p:cxnSp>
+      <p:sp>
+        <p:nvSpPr>
+          <p:cNvPr id="25" name="Овал 24"/>
+          <p:cNvSpPr/>
+          <p:nvPr/>
+        </p:nvSpPr>
+        <p:spPr>
+          <a:xfrm>
+            <a:off x="6156176" y="2838009"/>
+            <a:ext cx="2256957" cy="845728"/>
+          </a:xfrm>
+          <a:prstGeom prst="ellipse">
+            <a:avLst/>
+          </a:prstGeom>
+        </p:spPr>
+        <p:style>
+          <a:lnRef idx="2">
+            <a:schemeClr val="accent1">
+              <a:shade val="50000"/>
+            </a:schemeClr>
+          </a:lnRef>
+          <a:fillRef idx="1">
+            <a:schemeClr val="accent1"/>
+          </a:fillRef>
+          <a:effectRef idx="0">
+            <a:schemeClr val="accent1"/>
+          </a:effectRef>
+          <a:fontRef idx="minor">
+            <a:schemeClr val="lt1"/>
+          </a:fontRef>
+        </p:style>
+        <p:txBody>
+          <a:bodyPr rtlCol="0" anchor="ctr"/>
+          <a:lstStyle/>
+          <a:p>
+            <a:pPr algn="ctr"/>
+            <a:r>
+              <a:rPr lang="en-US" dirty="0" smtClean="0"/>
+              <a:t>Sound Bind</a:t>
+            </a:r>
+            <a:endParaRPr lang="ru-RU" dirty="0"/>
+          </a:p>
+        </p:txBody>
+      </p:sp>
+      <p:sp>
+        <p:nvSpPr>
+          <p:cNvPr id="27" name="Овал 26"/>
+          <p:cNvSpPr/>
+          <p:nvPr/>
+        </p:nvSpPr>
+        <p:spPr>
+          <a:xfrm>
+            <a:off x="3491880" y="4528872"/>
+            <a:ext cx="2012310" cy="914400"/>
+          </a:xfrm>
+          <a:prstGeom prst="ellipse">
+            <a:avLst/>
+          </a:prstGeom>
+        </p:spPr>
+        <p:style>
+          <a:lnRef idx="2">
+            <a:schemeClr val="accent1">
+              <a:shade val="50000"/>
+            </a:schemeClr>
+          </a:lnRef>
+          <a:fillRef idx="1">
+            <a:schemeClr val="accent1"/>
+          </a:fillRef>
+          <a:effectRef idx="0">
+            <a:schemeClr val="accent1"/>
+          </a:effectRef>
+          <a:fontRef idx="minor">
+            <a:schemeClr val="lt1"/>
+          </a:fontRef>
+        </p:style>
+        <p:txBody>
+          <a:bodyPr rtlCol="0" anchor="ctr"/>
+          <a:lstStyle/>
+          <a:p>
+            <a:pPr algn="ctr"/>
+            <a:r>
+              <a:rPr lang="en-US" dirty="0" smtClean="0"/>
+              <a:t>Select Text</a:t>
+            </a:r>
+            <a:endParaRPr lang="ru-RU" dirty="0"/>
+          </a:p>
+        </p:txBody>
+      </p:sp>
+      <p:cxnSp>
+        <p:nvCxnSpPr>
+          <p:cNvPr id="40" name="Прямая со стрелкой 39"/>
+          <p:cNvCxnSpPr>
+            <a:stCxn id="25" idx="2"/>
+            <a:endCxn id="17" idx="6"/>
+          </p:cNvCxnSpPr>
+          <p:nvPr/>
+        </p:nvCxnSpPr>
+        <p:spPr>
+          <a:xfrm flipH="1" flipV="1">
+            <a:off x="4752590" y="2762661"/>
+            <a:ext cx="1403586" cy="498212"/>
+          </a:xfrm>
+          <a:prstGeom prst="straightConnector1">
+            <a:avLst/>
+          </a:prstGeom>
+          <a:ln>
+            <a:tailEnd type="arrow"/>
+          </a:ln>
+        </p:spPr>
+        <p:style>
+          <a:lnRef idx="3">
+            <a:schemeClr val="accent3"/>
+          </a:lnRef>
+          <a:fillRef idx="0">
+            <a:schemeClr val="accent3"/>
+          </a:fillRef>
+          <a:effectRef idx="2">
+            <a:schemeClr val="accent3"/>
+          </a:effectRef>
+          <a:fontRef idx="minor">
+            <a:schemeClr val="tx1"/>
+          </a:fontRef>
+        </p:style>
+      </p:cxnSp>
+      <p:cxnSp>
+        <p:nvCxnSpPr>
+          <p:cNvPr id="42" name="Прямая со стрелкой 41"/>
+          <p:cNvCxnSpPr>
+            <a:stCxn id="25" idx="2"/>
+            <a:endCxn id="18" idx="6"/>
+          </p:cNvCxnSpPr>
+          <p:nvPr/>
+        </p:nvCxnSpPr>
+        <p:spPr>
+          <a:xfrm flipH="1">
+            <a:off x="4843344" y="3260873"/>
+            <a:ext cx="1312832" cy="668631"/>
+          </a:xfrm>
+          <a:prstGeom prst="straightConnector1">
+            <a:avLst/>
+          </a:prstGeom>
+          <a:ln>
+            <a:tailEnd type="arrow"/>
+          </a:ln>
+        </p:spPr>
+        <p:style>
+          <a:lnRef idx="3">
+            <a:schemeClr val="accent3"/>
+          </a:lnRef>
+          <a:fillRef idx="0">
+            <a:schemeClr val="accent3"/>
+          </a:fillRef>
+          <a:effectRef idx="2">
+            <a:schemeClr val="accent3"/>
+          </a:effectRef>
+          <a:fontRef idx="minor">
+            <a:schemeClr val="tx1"/>
+          </a:fontRef>
+        </p:style>
+      </p:cxnSp>
+      <p:sp>
+        <p:nvSpPr>
+          <p:cNvPr id="46" name="Овал 45"/>
+          <p:cNvSpPr/>
+          <p:nvPr/>
+        </p:nvSpPr>
+        <p:spPr>
+          <a:xfrm>
+            <a:off x="3215554" y="5685159"/>
+            <a:ext cx="1893545" cy="914400"/>
+          </a:xfrm>
+          <a:prstGeom prst="ellipse">
+            <a:avLst/>
+          </a:prstGeom>
+        </p:spPr>
+        <p:style>
+          <a:lnRef idx="2">
+            <a:schemeClr val="accent1">
+              <a:shade val="50000"/>
+            </a:schemeClr>
+          </a:lnRef>
+          <a:fillRef idx="1">
+            <a:schemeClr val="accent1"/>
+          </a:fillRef>
+          <a:effectRef idx="0">
+            <a:schemeClr val="accent1"/>
+          </a:effectRef>
+          <a:fontRef idx="minor">
+            <a:schemeClr val="lt1"/>
+          </a:fontRef>
+        </p:style>
+        <p:txBody>
+          <a:bodyPr rtlCol="0" anchor="ctr"/>
+          <a:lstStyle/>
+          <a:p>
+            <a:pPr algn="ctr"/>
+            <a:r>
+              <a:rPr lang="en-US" dirty="0" smtClean="0"/>
+              <a:t>Select</a:t>
+            </a:r>
+            <a:r>
+              <a:rPr lang="ru-RU" dirty="0" smtClean="0"/>
+              <a:t> </a:t>
+            </a:r>
+            <a:r>
+              <a:rPr lang="en-US" dirty="0" smtClean="0"/>
+              <a:t>Sound</a:t>
+            </a:r>
+            <a:endParaRPr lang="ru-RU" dirty="0"/>
+          </a:p>
+        </p:txBody>
+      </p:sp>
+      <p:sp>
+        <p:nvSpPr>
+          <p:cNvPr id="94" name="Овал 93"/>
+          <p:cNvSpPr/>
+          <p:nvPr/>
+        </p:nvSpPr>
+        <p:spPr>
+          <a:xfrm>
+            <a:off x="6012160" y="3961885"/>
+            <a:ext cx="2880320" cy="1205887"/>
+          </a:xfrm>
+          <a:prstGeom prst="ellipse">
+            <a:avLst/>
+          </a:prstGeom>
+        </p:spPr>
+        <p:style>
+          <a:lnRef idx="2">
+            <a:schemeClr val="accent1">
+              <a:shade val="50000"/>
+            </a:schemeClr>
+          </a:lnRef>
+          <a:fillRef idx="1">
+            <a:schemeClr val="accent1"/>
+          </a:fillRef>
+          <a:effectRef idx="0">
+            <a:schemeClr val="accent1"/>
+          </a:effectRef>
+          <a:fontRef idx="minor">
+            <a:schemeClr val="lt1"/>
+          </a:fontRef>
+        </p:style>
+        <p:txBody>
+          <a:bodyPr rtlCol="0" anchor="ctr"/>
+          <a:lstStyle/>
+          <a:p>
+            <a:pPr algn="ctr"/>
+            <a:r>
+              <a:rPr lang="ru-RU" dirty="0" smtClean="0"/>
+              <a:t>Установить соответствующую позицию плееру</a:t>
+            </a:r>
+            <a:endParaRPr lang="ru-RU" dirty="0"/>
+          </a:p>
+        </p:txBody>
+      </p:sp>
+      <p:cxnSp>
+        <p:nvCxnSpPr>
+          <p:cNvPr id="100" name="Прямая со стрелкой 99"/>
+          <p:cNvCxnSpPr>
+            <a:stCxn id="94" idx="2"/>
+          </p:cNvCxnSpPr>
+          <p:nvPr/>
+        </p:nvCxnSpPr>
+        <p:spPr>
+          <a:xfrm flipH="1">
+            <a:off x="5504190" y="4564829"/>
+            <a:ext cx="507970" cy="314696"/>
+          </a:xfrm>
+          <a:prstGeom prst="straightConnector1">
+            <a:avLst/>
+          </a:prstGeom>
+          <a:ln>
+            <a:tailEnd type="arrow"/>
+          </a:ln>
+        </p:spPr>
+        <p:style>
+          <a:lnRef idx="3">
+            <a:schemeClr val="accent5"/>
+          </a:lnRef>
+          <a:fillRef idx="0">
+            <a:schemeClr val="accent5"/>
+          </a:fillRef>
+          <a:effectRef idx="2">
+            <a:schemeClr val="accent5"/>
+          </a:effectRef>
+          <a:fontRef idx="minor">
+            <a:schemeClr val="tx1"/>
+          </a:fontRef>
+        </p:style>
+      </p:cxnSp>
+      <p:sp>
+        <p:nvSpPr>
+          <p:cNvPr id="101" name="Овал 100"/>
+          <p:cNvSpPr/>
+          <p:nvPr/>
+        </p:nvSpPr>
+        <p:spPr>
+          <a:xfrm>
+            <a:off x="5796136" y="5443273"/>
+            <a:ext cx="2952328" cy="1156286"/>
+          </a:xfrm>
+          <a:prstGeom prst="ellipse">
+            <a:avLst/>
+          </a:prstGeom>
+        </p:spPr>
+        <p:style>
+          <a:lnRef idx="2">
+            <a:schemeClr val="accent1">
+              <a:shade val="50000"/>
+            </a:schemeClr>
+          </a:lnRef>
+          <a:fillRef idx="1">
+            <a:schemeClr val="accent1"/>
+          </a:fillRef>
+          <a:effectRef idx="0">
+            <a:schemeClr val="accent1"/>
+          </a:effectRef>
+          <a:fontRef idx="minor">
+            <a:schemeClr val="lt1"/>
+          </a:fontRef>
+        </p:style>
+        <p:txBody>
+          <a:bodyPr rtlCol="0" anchor="ctr"/>
+          <a:lstStyle/>
+          <a:p>
+            <a:pPr algn="ctr"/>
+            <a:r>
+              <a:rPr lang="ru-RU" dirty="0" smtClean="0"/>
+              <a:t>Выделить соответствующий текст</a:t>
+            </a:r>
+            <a:endParaRPr lang="ru-RU" dirty="0"/>
+          </a:p>
+        </p:txBody>
+      </p:sp>
+      <p:cxnSp>
+        <p:nvCxnSpPr>
+          <p:cNvPr id="103" name="Прямая со стрелкой 102"/>
+          <p:cNvCxnSpPr>
+            <a:stCxn id="101" idx="2"/>
+            <a:endCxn id="46" idx="6"/>
+          </p:cNvCxnSpPr>
+          <p:nvPr/>
+        </p:nvCxnSpPr>
+        <p:spPr>
+          <a:xfrm flipH="1">
+            <a:off x="5109099" y="6021416"/>
+            <a:ext cx="687037" cy="120943"/>
+          </a:xfrm>
+          <a:prstGeom prst="straightConnector1">
+            <a:avLst/>
+          </a:prstGeom>
+          <a:ln>
+            <a:tailEnd type="arrow"/>
+          </a:ln>
+        </p:spPr>
+        <p:style>
+          <a:lnRef idx="3">
+            <a:schemeClr val="accent5"/>
+          </a:lnRef>
+          <a:fillRef idx="0">
+            <a:schemeClr val="accent5"/>
+          </a:fillRef>
+          <a:effectRef idx="2">
+            <a:schemeClr val="accent5"/>
+          </a:effectRef>
+          <a:fontRef idx="minor">
+            <a:schemeClr val="tx1"/>
+          </a:fontRef>
+        </p:style>
+      </p:cxnSp>
+      <p:cxnSp>
+        <p:nvCxnSpPr>
+          <p:cNvPr id="144" name="Прямая со стрелкой 143"/>
+          <p:cNvCxnSpPr>
+            <a:stCxn id="12" idx="7"/>
+            <a:endCxn id="27" idx="2"/>
+          </p:cNvCxnSpPr>
+          <p:nvPr/>
+        </p:nvCxnSpPr>
+        <p:spPr>
+          <a:xfrm flipV="1">
+            <a:off x="2734309" y="4986072"/>
+            <a:ext cx="757571" cy="438586"/>
+          </a:xfrm>
+          <a:prstGeom prst="straightConnector1">
+            <a:avLst/>
+          </a:prstGeom>
+          <a:ln>
+            <a:tailEnd type="arrow"/>
+          </a:ln>
+        </p:spPr>
+        <p:style>
+          <a:lnRef idx="1">
+            <a:schemeClr val="accent1"/>
+          </a:lnRef>
+          <a:fillRef idx="0">
+            <a:schemeClr val="accent1"/>
+          </a:fillRef>
+          <a:effectRef idx="0">
+            <a:schemeClr val="accent1"/>
+          </a:effectRef>
+          <a:fontRef idx="minor">
+            <a:schemeClr val="tx1"/>
+          </a:fontRef>
+        </p:style>
+      </p:cxnSp>
+      <p:cxnSp>
+        <p:nvCxnSpPr>
+          <p:cNvPr id="147" name="Прямая со стрелкой 146"/>
+          <p:cNvCxnSpPr>
+            <a:stCxn id="12" idx="5"/>
+            <a:endCxn id="46" idx="2"/>
+          </p:cNvCxnSpPr>
+          <p:nvPr/>
+        </p:nvCxnSpPr>
+        <p:spPr>
+          <a:xfrm>
+            <a:off x="2734309" y="6108844"/>
+            <a:ext cx="481245" cy="33515"/>
+          </a:xfrm>
+          <a:prstGeom prst="straightConnector1">
+            <a:avLst/>
+          </a:prstGeom>
+          <a:ln>
+            <a:tailEnd type="arrow"/>
+          </a:ln>
+        </p:spPr>
+        <p:style>
+          <a:lnRef idx="1">
+            <a:schemeClr val="accent1"/>
+          </a:lnRef>
+          <a:fillRef idx="0">
+            <a:schemeClr val="accent1"/>
+          </a:fillRef>
+          <a:effectRef idx="0">
+            <a:schemeClr val="accent1"/>
+          </a:effectRef>
+          <a:fontRef idx="minor">
+            <a:schemeClr val="tx1"/>
+          </a:fontRef>
+        </p:style>
+      </p:cxnSp>
+      <p:grpSp>
+        <p:nvGrpSpPr>
+          <p:cNvPr id="197" name="Группа 196"/>
+          <p:cNvGrpSpPr/>
+          <p:nvPr/>
+        </p:nvGrpSpPr>
+        <p:grpSpPr>
+          <a:xfrm>
+            <a:off x="378908" y="891874"/>
+            <a:ext cx="2142087" cy="704946"/>
+            <a:chOff x="867511" y="895299"/>
+            <a:chExt cx="2142087" cy="704946"/>
+          </a:xfrm>
+        </p:grpSpPr>
+        <p:sp>
+          <p:nvSpPr>
+            <p:cNvPr id="196" name="Скругленный прямоугольник 195"/>
+            <p:cNvSpPr/>
+            <p:nvPr/>
+          </p:nvSpPr>
+          <p:spPr>
+            <a:xfrm>
+              <a:off x="867511" y="895299"/>
+              <a:ext cx="2024978" cy="704946"/>
+            </a:xfrm>
+            <a:prstGeom prst="roundRect">
+              <a:avLst/>
+            </a:prstGeom>
+          </p:spPr>
+          <p:style>
+            <a:lnRef idx="2">
+              <a:schemeClr val="accent5"/>
+            </a:lnRef>
+            <a:fillRef idx="1">
+              <a:schemeClr val="lt1"/>
+            </a:fillRef>
+            <a:effectRef idx="0">
+              <a:schemeClr val="accent5"/>
+            </a:effectRef>
+            <a:fontRef idx="minor">
+              <a:schemeClr val="dk1"/>
+            </a:fontRef>
+          </p:style>
+          <p:txBody>
+            <a:bodyPr rtlCol="0" anchor="ctr"/>
+            <a:lstStyle/>
+            <a:p>
+              <a:pPr algn="ctr"/>
+              <a:endParaRPr lang="ru-RU"/>
+            </a:p>
+          </p:txBody>
+        </p:sp>
+        <p:cxnSp>
+          <p:nvCxnSpPr>
+            <p:cNvPr id="161" name="Прямая со стрелкой 160"/>
+            <p:cNvCxnSpPr/>
+            <p:nvPr/>
+          </p:nvCxnSpPr>
+          <p:spPr>
+            <a:xfrm>
+              <a:off x="966866" y="1015579"/>
+              <a:ext cx="348822" cy="464385"/>
+            </a:xfrm>
+            <a:prstGeom prst="straightConnector1">
+              <a:avLst/>
+            </a:prstGeom>
+            <a:ln>
+              <a:tailEnd type="arrow"/>
+            </a:ln>
+          </p:spPr>
+          <p:style>
+            <a:lnRef idx="1">
+              <a:schemeClr val="accent1"/>
+            </a:lnRef>
+            <a:fillRef idx="0">
+              <a:schemeClr val="accent1"/>
+            </a:fillRef>
+            <a:effectRef idx="0">
+              <a:schemeClr val="accent1"/>
+            </a:effectRef>
+            <a:fontRef idx="minor">
+              <a:schemeClr val="tx1"/>
+            </a:fontRef>
+          </p:style>
+        </p:cxnSp>
+        <p:sp>
+          <p:nvSpPr>
+            <p:cNvPr id="192" name="TextBox 191"/>
+            <p:cNvSpPr txBox="1"/>
+            <p:nvPr/>
+          </p:nvSpPr>
+          <p:spPr>
+            <a:xfrm>
+              <a:off x="1342154" y="920362"/>
+              <a:ext cx="1667444" cy="646331"/>
+            </a:xfrm>
+            <a:prstGeom prst="rect">
+              <a:avLst/>
+            </a:prstGeom>
+            <a:noFill/>
+          </p:spPr>
+          <p:txBody>
+            <a:bodyPr wrap="none" rtlCol="0">
+              <a:spAutoFit/>
+            </a:bodyPr>
+            <a:lstStyle/>
+            <a:p>
+              <a:r>
+                <a:rPr lang="ru-RU" dirty="0" smtClean="0"/>
+                <a:t>Возможность </a:t>
+              </a:r>
+            </a:p>
+            <a:p>
+              <a:r>
+                <a:rPr lang="ru-RU" dirty="0" smtClean="0"/>
+                <a:t>перехода</a:t>
+              </a:r>
+              <a:endParaRPr lang="ru-RU" dirty="0"/>
+            </a:p>
+          </p:txBody>
+        </p:sp>
+      </p:grpSp>
+      <p:grpSp>
+        <p:nvGrpSpPr>
+          <p:cNvPr id="199" name="Группа 198"/>
+          <p:cNvGrpSpPr/>
+          <p:nvPr/>
+        </p:nvGrpSpPr>
+        <p:grpSpPr>
+          <a:xfrm>
+            <a:off x="372485" y="1735376"/>
+            <a:ext cx="2034685" cy="704946"/>
+            <a:chOff x="867511" y="895299"/>
+            <a:chExt cx="2034685" cy="704946"/>
+          </a:xfrm>
+        </p:grpSpPr>
+        <p:sp>
+          <p:nvSpPr>
+            <p:cNvPr id="200" name="Скругленный прямоугольник 199"/>
+            <p:cNvSpPr/>
+            <p:nvPr/>
+          </p:nvSpPr>
+          <p:spPr>
+            <a:xfrm>
+              <a:off x="867511" y="895299"/>
+              <a:ext cx="2024978" cy="704946"/>
+            </a:xfrm>
+            <a:prstGeom prst="roundRect">
+              <a:avLst/>
+            </a:prstGeom>
+          </p:spPr>
+          <p:style>
+            <a:lnRef idx="2">
+              <a:schemeClr val="accent5"/>
+            </a:lnRef>
+            <a:fillRef idx="1">
+              <a:schemeClr val="lt1"/>
+            </a:fillRef>
+            <a:effectRef idx="0">
+              <a:schemeClr val="accent5"/>
+            </a:effectRef>
+            <a:fontRef idx="minor">
+              <a:schemeClr val="dk1"/>
+            </a:fontRef>
+          </p:style>
+          <p:txBody>
+            <a:bodyPr rtlCol="0" anchor="ctr"/>
+            <a:lstStyle/>
+            <a:p>
+              <a:pPr algn="ctr"/>
+              <a:endParaRPr lang="ru-RU"/>
+            </a:p>
+          </p:txBody>
+        </p:sp>
+        <p:cxnSp>
+          <p:nvCxnSpPr>
+            <p:cNvPr id="201" name="Прямая со стрелкой 200"/>
+            <p:cNvCxnSpPr/>
+            <p:nvPr/>
+          </p:nvCxnSpPr>
+          <p:spPr>
+            <a:xfrm>
+              <a:off x="966866" y="1015579"/>
+              <a:ext cx="348822" cy="464385"/>
+            </a:xfrm>
+            <a:prstGeom prst="straightConnector1">
+              <a:avLst/>
+            </a:prstGeom>
+            <a:ln>
+              <a:tailEnd type="arrow"/>
+            </a:ln>
+          </p:spPr>
+          <p:style>
+            <a:lnRef idx="3">
+              <a:schemeClr val="accent3"/>
+            </a:lnRef>
+            <a:fillRef idx="0">
+              <a:schemeClr val="accent3"/>
+            </a:fillRef>
+            <a:effectRef idx="2">
+              <a:schemeClr val="accent3"/>
+            </a:effectRef>
+            <a:fontRef idx="minor">
+              <a:schemeClr val="tx1"/>
+            </a:fontRef>
+          </p:style>
+        </p:cxnSp>
+        <p:sp>
+          <p:nvSpPr>
+            <p:cNvPr id="202" name="TextBox 201"/>
+            <p:cNvSpPr txBox="1"/>
+            <p:nvPr/>
+          </p:nvSpPr>
+          <p:spPr>
+            <a:xfrm>
+              <a:off x="1342154" y="920362"/>
+              <a:ext cx="1560042" cy="646331"/>
+            </a:xfrm>
+            <a:prstGeom prst="rect">
+              <a:avLst/>
+            </a:prstGeom>
+            <a:noFill/>
+          </p:spPr>
+          <p:txBody>
+            <a:bodyPr wrap="none" rtlCol="0">
+              <a:spAutoFit/>
+            </a:bodyPr>
+            <a:lstStyle/>
+            <a:p>
+              <a:r>
+                <a:rPr lang="ru-RU" dirty="0" smtClean="0"/>
+                <a:t>Возможность</a:t>
+              </a:r>
+            </a:p>
+            <a:p>
+              <a:r>
+                <a:rPr lang="ru-RU" dirty="0" smtClean="0"/>
+                <a:t>(</a:t>
+              </a:r>
+              <a:r>
+                <a:rPr lang="en-US" dirty="0" smtClean="0"/>
+                <a:t>extend</a:t>
+              </a:r>
+              <a:r>
+                <a:rPr lang="ru-RU" dirty="0" smtClean="0"/>
+                <a:t>)</a:t>
+              </a:r>
+              <a:endParaRPr lang="ru-RU" dirty="0"/>
+            </a:p>
+          </p:txBody>
+        </p:sp>
+      </p:grpSp>
+      <p:grpSp>
+        <p:nvGrpSpPr>
+          <p:cNvPr id="203" name="Группа 202"/>
+          <p:cNvGrpSpPr/>
+          <p:nvPr/>
+        </p:nvGrpSpPr>
+        <p:grpSpPr>
+          <a:xfrm>
+            <a:off x="372485" y="2668360"/>
+            <a:ext cx="2024978" cy="704946"/>
+            <a:chOff x="867511" y="895299"/>
+            <a:chExt cx="2024978" cy="704946"/>
+          </a:xfrm>
+        </p:grpSpPr>
+        <p:sp>
+          <p:nvSpPr>
+            <p:cNvPr id="204" name="Скругленный прямоугольник 203"/>
+            <p:cNvSpPr/>
+            <p:nvPr/>
+          </p:nvSpPr>
+          <p:spPr>
+            <a:xfrm>
+              <a:off x="867511" y="895299"/>
+              <a:ext cx="2024978" cy="704946"/>
+            </a:xfrm>
+            <a:prstGeom prst="roundRect">
+              <a:avLst/>
+            </a:prstGeom>
+          </p:spPr>
+          <p:style>
+            <a:lnRef idx="2">
+              <a:schemeClr val="accent5"/>
+            </a:lnRef>
+            <a:fillRef idx="1">
+              <a:schemeClr val="lt1"/>
+            </a:fillRef>
+            <a:effectRef idx="0">
+              <a:schemeClr val="accent5"/>
+            </a:effectRef>
+            <a:fontRef idx="minor">
+              <a:schemeClr val="dk1"/>
+            </a:fontRef>
+          </p:style>
+          <p:txBody>
+            <a:bodyPr rtlCol="0" anchor="ctr"/>
+            <a:lstStyle/>
+            <a:p>
+              <a:pPr algn="ctr"/>
+              <a:endParaRPr lang="ru-RU"/>
+            </a:p>
+          </p:txBody>
+        </p:sp>
+        <p:cxnSp>
+          <p:nvCxnSpPr>
+            <p:cNvPr id="205" name="Прямая со стрелкой 204"/>
+            <p:cNvCxnSpPr/>
+            <p:nvPr/>
+          </p:nvCxnSpPr>
+          <p:spPr>
+            <a:xfrm>
+              <a:off x="966866" y="1015579"/>
+              <a:ext cx="348822" cy="464385"/>
+            </a:xfrm>
+            <a:prstGeom prst="straightConnector1">
+              <a:avLst/>
+            </a:prstGeom>
+            <a:ln>
+              <a:tailEnd type="arrow"/>
+            </a:ln>
+          </p:spPr>
+          <p:style>
+            <a:lnRef idx="3">
+              <a:schemeClr val="accent5"/>
+            </a:lnRef>
+            <a:fillRef idx="0">
+              <a:schemeClr val="accent5"/>
+            </a:fillRef>
+            <a:effectRef idx="2">
+              <a:schemeClr val="accent5"/>
+            </a:effectRef>
+            <a:fontRef idx="minor">
+              <a:schemeClr val="tx1"/>
+            </a:fontRef>
+          </p:style>
+        </p:cxnSp>
+        <p:sp>
+          <p:nvSpPr>
+            <p:cNvPr id="206" name="TextBox 205"/>
+            <p:cNvSpPr txBox="1"/>
+            <p:nvPr/>
+          </p:nvSpPr>
+          <p:spPr>
+            <a:xfrm>
+              <a:off x="1342154" y="920362"/>
+              <a:ext cx="1308371" cy="646331"/>
+            </a:xfrm>
+            <a:prstGeom prst="rect">
+              <a:avLst/>
+            </a:prstGeom>
+            <a:noFill/>
+          </p:spPr>
+          <p:txBody>
+            <a:bodyPr wrap="none" rtlCol="0">
+              <a:spAutoFit/>
+            </a:bodyPr>
+            <a:lstStyle/>
+            <a:p>
+              <a:r>
+                <a:rPr lang="ru-RU" dirty="0" smtClean="0"/>
+                <a:t>Включение</a:t>
+              </a:r>
+              <a:endParaRPr lang="en-US" dirty="0" smtClean="0"/>
+            </a:p>
+            <a:p>
+              <a:r>
+                <a:rPr lang="en-US" dirty="0" smtClean="0"/>
+                <a:t>(include)</a:t>
+              </a:r>
+              <a:endParaRPr lang="ru-RU" dirty="0"/>
+            </a:p>
+          </p:txBody>
+        </p:sp>
+      </p:grpSp>
+    </p:spTree>
+    <p:extLst>
+      <p:ext uri="{BB962C8B-B14F-4D97-AF65-F5344CB8AC3E}">
+        <p14:creationId xmlns:p14="http://schemas.microsoft.com/office/powerpoint/2010/main" val="3850820553"/>
+      </p:ext>
+    </p:extLst>
+  </p:cSld>
+  <p:clrMapOvr>
+    <a:masterClrMapping/>
+  </p:clrMapOvr>
+</p:sld>
+</file>
+
+<file path=ppt/slides/slide3.xml><?xml version="1.0" encoding="utf-8"?>
 <p:sld xmlns:a="http://schemas.openxmlformats.org/drawingml/2006/main" xmlns:r="http://schemas.openxmlformats.org/officeDocument/2006/relationships" xmlns:p="http://schemas.openxmlformats.org/presentationml/2006/main">
   <p:cSld>
     <p:spTree>
@@ -18500,7 +19897,7 @@
 </p:sld>
 </file>
 
-<file path=ppt/slides/slide3.xml><?xml version="1.0" encoding="utf-8"?>
+<file path=ppt/slides/slide4.xml><?xml version="1.0" encoding="utf-8"?>
 <p:sld xmlns:a="http://schemas.openxmlformats.org/drawingml/2006/main" xmlns:r="http://schemas.openxmlformats.org/officeDocument/2006/relationships" xmlns:p="http://schemas.openxmlformats.org/presentationml/2006/main">
   <p:cSld>
     <p:spTree>
@@ -18535,6 +19932,14 @@
             <a:r>
               <a:rPr lang="ru-RU" dirty="0" smtClean="0"/>
               <a:t>Зависимости</a:t>
+            </a:r>
+            <a:r>
+              <a:rPr lang="en-US" dirty="0" smtClean="0"/>
+              <a:t> </a:t>
+            </a:r>
+            <a:r>
+              <a:rPr lang="ru-RU" dirty="0" smtClean="0"/>
+              <a:t>классов</a:t>
             </a:r>
             <a:endParaRPr lang="ru-RU" dirty="0"/>
           </a:p>
@@ -18780,6 +20185,78 @@
       </p:par>
     </p:tnLst>
   </p:timing>
+</p:sld>
+</file>
+
+<file path=ppt/slides/slide5.xml><?xml version="1.0" encoding="utf-8"?>
+<p:sld xmlns:a="http://schemas.openxmlformats.org/drawingml/2006/main" xmlns:r="http://schemas.openxmlformats.org/officeDocument/2006/relationships" xmlns:p="http://schemas.openxmlformats.org/presentationml/2006/main">
+  <p:cSld>
+    <p:spTree>
+      <p:nvGrpSpPr>
+        <p:cNvPr id="1" name=""/>
+        <p:cNvGrpSpPr/>
+        <p:nvPr/>
+      </p:nvGrpSpPr>
+      <p:grpSpPr>
+        <a:xfrm>
+          <a:off x="0" y="0"/>
+          <a:ext cx="0" cy="0"/>
+          <a:chOff x="0" y="0"/>
+          <a:chExt cx="0" cy="0"/>
+        </a:xfrm>
+      </p:grpSpPr>
+      <p:sp>
+        <p:nvSpPr>
+          <p:cNvPr id="2" name="Объект 1"/>
+          <p:cNvSpPr>
+            <a:spLocks noGrp="1"/>
+          </p:cNvSpPr>
+          <p:nvPr>
+            <p:ph idx="1"/>
+          </p:nvPr>
+        </p:nvSpPr>
+        <p:spPr/>
+        <p:txBody>
+          <a:bodyPr/>
+          <a:lstStyle/>
+          <a:p>
+            <a:endParaRPr lang="ru-RU"/>
+          </a:p>
+        </p:txBody>
+      </p:sp>
+      <p:sp>
+        <p:nvSpPr>
+          <p:cNvPr id="3" name="Заголовок 2"/>
+          <p:cNvSpPr>
+            <a:spLocks noGrp="1"/>
+          </p:cNvSpPr>
+          <p:nvPr>
+            <p:ph type="title"/>
+          </p:nvPr>
+        </p:nvSpPr>
+        <p:spPr/>
+        <p:txBody>
+          <a:bodyPr/>
+          <a:lstStyle/>
+          <a:p>
+            <a:r>
+              <a:rPr lang="ru-RU" dirty="0" smtClean="0"/>
+              <a:t>Взаимодействие с интерфейсом</a:t>
+            </a:r>
+            <a:endParaRPr lang="ru-RU" dirty="0"/>
+          </a:p>
+        </p:txBody>
+      </p:sp>
+    </p:spTree>
+    <p:extLst>
+      <p:ext uri="{BB962C8B-B14F-4D97-AF65-F5344CB8AC3E}">
+        <p14:creationId xmlns:p14="http://schemas.microsoft.com/office/powerpoint/2010/main" val="413185205"/>
+      </p:ext>
+    </p:extLst>
+  </p:cSld>
+  <p:clrMapOvr>
+    <a:masterClrMapping/>
+  </p:clrMapOvr>
 </p:sld>
 </file>
 

</xml_diff>

<commit_message>
deleted inherest factoryes due to hard realise. Now use sample factoryes.
</commit_message>
<xml_diff>
--- a/Documentation/aboutClasses.pptx
+++ b/Documentation/aboutClasses.pptx
@@ -10,6 +10,7 @@
     <p:sldId id="257" r:id="rId4"/>
     <p:sldId id="258" r:id="rId5"/>
     <p:sldId id="260" r:id="rId6"/>
+    <p:sldId id="261" r:id="rId7"/>
   </p:sldIdLst>
   <p:sldSz cx="9144000" cy="6858000" type="screen4x3"/>
   <p:notesSz cx="6858000" cy="9144000"/>
@@ -19973,7 +19974,7 @@
         <p:spPr>
           <a:xfrm>
             <a:off x="1115616" y="3181600"/>
-            <a:ext cx="1512168" cy="720080"/>
+            <a:ext cx="1656184" cy="720080"/>
           </a:xfrm>
           <a:prstGeom prst="roundRect">
             <a:avLst/>
@@ -19999,10 +20000,10 @@
           <a:bodyPr rtlCol="0" anchor="ctr"/>
           <a:lstStyle/>
           <a:p>
-            <a:pPr algn="ctr"/>
+            <a:pPr lvl="0" algn="ctr"/>
             <a:r>
               <a:rPr lang="en-US" dirty="0" err="1" smtClean="0"/>
-              <a:t>SoundStore</a:t>
+              <a:t>SoundReader</a:t>
             </a:r>
             <a:endParaRPr lang="ru-RU" dirty="0"/>
           </a:p>
@@ -20107,8 +20108,8 @@
         </p:nvCxnSpPr>
         <p:spPr>
           <a:xfrm rot="10800000">
-            <a:off x="1871700" y="3901680"/>
-            <a:ext cx="468052" cy="823464"/>
+            <a:off x="1943708" y="3901680"/>
+            <a:ext cx="396044" cy="823464"/>
           </a:xfrm>
           <a:prstGeom prst="bentConnector2">
             <a:avLst/>
@@ -20251,6 +20252,116 @@
     <p:extLst>
       <p:ext uri="{BB962C8B-B14F-4D97-AF65-F5344CB8AC3E}">
         <p14:creationId xmlns:p14="http://schemas.microsoft.com/office/powerpoint/2010/main" val="413185205"/>
+      </p:ext>
+    </p:extLst>
+  </p:cSld>
+  <p:clrMapOvr>
+    <a:masterClrMapping/>
+  </p:clrMapOvr>
+</p:sld>
+</file>
+
+<file path=ppt/slides/slide6.xml><?xml version="1.0" encoding="utf-8"?>
+<p:sld xmlns:a="http://schemas.openxmlformats.org/drawingml/2006/main" xmlns:r="http://schemas.openxmlformats.org/officeDocument/2006/relationships" xmlns:p="http://schemas.openxmlformats.org/presentationml/2006/main">
+  <p:cSld>
+    <p:spTree>
+      <p:nvGrpSpPr>
+        <p:cNvPr id="1" name=""/>
+        <p:cNvGrpSpPr/>
+        <p:nvPr/>
+      </p:nvGrpSpPr>
+      <p:grpSpPr>
+        <a:xfrm>
+          <a:off x="0" y="0"/>
+          <a:ext cx="0" cy="0"/>
+          <a:chOff x="0" y="0"/>
+          <a:chExt cx="0" cy="0"/>
+        </a:xfrm>
+      </p:grpSpPr>
+      <p:sp>
+        <p:nvSpPr>
+          <p:cNvPr id="2" name="Объект 1"/>
+          <p:cNvSpPr>
+            <a:spLocks noGrp="1"/>
+          </p:cNvSpPr>
+          <p:nvPr>
+            <p:ph idx="1"/>
+          </p:nvPr>
+        </p:nvSpPr>
+        <p:spPr/>
+        <p:txBody>
+          <a:bodyPr/>
+          <a:lstStyle/>
+          <a:p>
+            <a:r>
+              <a:rPr lang="ru-RU" dirty="0" smtClean="0"/>
+              <a:t>Справка о выделенном используя специализированный сайт через интерфейс </a:t>
+            </a:r>
+            <a:r>
+              <a:rPr lang="en-US" dirty="0" err="1" smtClean="0"/>
+              <a:t>QWebView</a:t>
+            </a:r>
+            <a:r>
+              <a:rPr lang="en-US" dirty="0" smtClean="0"/>
+              <a:t> </a:t>
+            </a:r>
+            <a:endParaRPr lang="ru-RU" dirty="0" smtClean="0"/>
+          </a:p>
+          <a:p>
+            <a:r>
+              <a:rPr lang="ru-RU" dirty="0" smtClean="0"/>
+              <a:t>Работа с </a:t>
+            </a:r>
+            <a:r>
+              <a:rPr lang="ru-RU" dirty="0" err="1" smtClean="0"/>
+              <a:t>Видио</a:t>
+            </a:r>
+            <a:endParaRPr lang="ru-RU" dirty="0" smtClean="0"/>
+          </a:p>
+          <a:p>
+            <a:endParaRPr lang="ru-RU" dirty="0"/>
+          </a:p>
+        </p:txBody>
+      </p:sp>
+      <p:sp>
+        <p:nvSpPr>
+          <p:cNvPr id="3" name="Заголовок 2"/>
+          <p:cNvSpPr>
+            <a:spLocks noGrp="1"/>
+          </p:cNvSpPr>
+          <p:nvPr>
+            <p:ph type="title"/>
+          </p:nvPr>
+        </p:nvSpPr>
+        <p:spPr/>
+        <p:txBody>
+          <a:bodyPr/>
+          <a:lstStyle/>
+          <a:p>
+            <a:r>
+              <a:rPr lang="ru-RU" dirty="0" err="1" smtClean="0"/>
+              <a:t>Фичи</a:t>
+            </a:r>
+            <a:r>
+              <a:rPr lang="ru-RU" dirty="0" smtClean="0"/>
+              <a:t> </a:t>
+            </a:r>
+            <a:r>
+              <a:rPr lang="en-US" dirty="0" smtClean="0"/>
+              <a:t>v1.0</a:t>
+            </a:r>
+            <a:r>
+              <a:rPr lang="ru-RU" dirty="0" smtClean="0"/>
+              <a:t>+</a:t>
+            </a:r>
+            <a:endParaRPr lang="ru-RU" dirty="0"/>
+          </a:p>
+        </p:txBody>
+      </p:sp>
+    </p:spTree>
+    <p:extLst>
+      <p:ext uri="{BB962C8B-B14F-4D97-AF65-F5344CB8AC3E}">
+        <p14:creationId xmlns:p14="http://schemas.microsoft.com/office/powerpoint/2010/main" val="221635094"/>
       </p:ext>
     </p:extLst>
   </p:cSld>

</xml_diff>

<commit_message>
I think now need BackUp
</commit_message>
<xml_diff>
--- a/Documentation/aboutClasses.pptx
+++ b/Documentation/aboutClasses.pptx
@@ -5793,7 +5793,7 @@
           <a:p>
             <a:fld id="{EEC29AEC-8047-4BDA-97D7-D38AC62176F2}" type="datetimeFigureOut">
               <a:rPr lang="ru-RU" smtClean="0"/>
-              <a:t>14.09.2016</a:t>
+              <a:t>20.09.2016</a:t>
             </a:fld>
             <a:endParaRPr lang="ru-RU"/>
           </a:p>
@@ -5974,7 +5974,7 @@
           <a:p>
             <a:fld id="{EEC29AEC-8047-4BDA-97D7-D38AC62176F2}" type="datetimeFigureOut">
               <a:rPr lang="ru-RU" smtClean="0"/>
-              <a:t>14.09.2016</a:t>
+              <a:t>20.09.2016</a:t>
             </a:fld>
             <a:endParaRPr lang="ru-RU"/>
           </a:p>
@@ -6125,7 +6125,7 @@
           <a:p>
             <a:fld id="{EEC29AEC-8047-4BDA-97D7-D38AC62176F2}" type="datetimeFigureOut">
               <a:rPr lang="ru-RU" smtClean="0"/>
-              <a:t>14.09.2016</a:t>
+              <a:t>20.09.2016</a:t>
             </a:fld>
             <a:endParaRPr lang="ru-RU"/>
           </a:p>
@@ -7951,7 +7951,7 @@
           <a:p>
             <a:fld id="{EEC29AEC-8047-4BDA-97D7-D38AC62176F2}" type="datetimeFigureOut">
               <a:rPr lang="ru-RU" smtClean="0"/>
-              <a:t>14.09.2016</a:t>
+              <a:t>20.09.2016</a:t>
             </a:fld>
             <a:endParaRPr lang="ru-RU"/>
           </a:p>
@@ -9821,7 +9821,7 @@
           <a:p>
             <a:fld id="{EEC29AEC-8047-4BDA-97D7-D38AC62176F2}" type="datetimeFigureOut">
               <a:rPr lang="ru-RU" smtClean="0"/>
-              <a:t>14.09.2016</a:t>
+              <a:t>20.09.2016</a:t>
             </a:fld>
             <a:endParaRPr lang="ru-RU"/>
           </a:p>
@@ -9934,7 +9934,7 @@
           <a:p>
             <a:fld id="{EEC29AEC-8047-4BDA-97D7-D38AC62176F2}" type="datetimeFigureOut">
               <a:rPr lang="ru-RU" smtClean="0"/>
-              <a:t>14.09.2016</a:t>
+              <a:t>20.09.2016</a:t>
             </a:fld>
             <a:endParaRPr lang="ru-RU"/>
           </a:p>
@@ -10475,7 +10475,7 @@
           <a:p>
             <a:fld id="{EEC29AEC-8047-4BDA-97D7-D38AC62176F2}" type="datetimeFigureOut">
               <a:rPr lang="ru-RU" smtClean="0"/>
-              <a:t>14.09.2016</a:t>
+              <a:t>20.09.2016</a:t>
             </a:fld>
             <a:endParaRPr lang="ru-RU"/>
           </a:p>
@@ -10588,7 +10588,7 @@
           <a:p>
             <a:fld id="{EEC29AEC-8047-4BDA-97D7-D38AC62176F2}" type="datetimeFigureOut">
               <a:rPr lang="ru-RU" smtClean="0"/>
-              <a:t>14.09.2016</a:t>
+              <a:t>20.09.2016</a:t>
             </a:fld>
             <a:endParaRPr lang="ru-RU"/>
           </a:p>
@@ -12299,7 +12299,7 @@
           <a:p>
             <a:fld id="{EEC29AEC-8047-4BDA-97D7-D38AC62176F2}" type="datetimeFigureOut">
               <a:rPr lang="ru-RU" smtClean="0"/>
-              <a:t>14.09.2016</a:t>
+              <a:t>20.09.2016</a:t>
             </a:fld>
             <a:endParaRPr lang="ru-RU"/>
           </a:p>
@@ -12450,7 +12450,7 @@
           <a:p>
             <a:fld id="{EEC29AEC-8047-4BDA-97D7-D38AC62176F2}" type="datetimeFigureOut">
               <a:rPr lang="ru-RU" smtClean="0"/>
-              <a:t>14.09.2016</a:t>
+              <a:t>20.09.2016</a:t>
             </a:fld>
             <a:endParaRPr lang="ru-RU"/>
           </a:p>
@@ -16065,7 +16065,7 @@
           <a:p>
             <a:fld id="{EEC29AEC-8047-4BDA-97D7-D38AC62176F2}" type="datetimeFigureOut">
               <a:rPr lang="ru-RU" smtClean="0"/>
-              <a:t>14.09.2016</a:t>
+              <a:t>20.09.2016</a:t>
             </a:fld>
             <a:endParaRPr lang="ru-RU"/>
           </a:p>
@@ -17924,7 +17924,7 @@
           <a:p>
             <a:fld id="{EEC29AEC-8047-4BDA-97D7-D38AC62176F2}" type="datetimeFigureOut">
               <a:rPr lang="ru-RU" smtClean="0"/>
-              <a:t>14.09.2016</a:t>
+              <a:t>20.09.2016</a:t>
             </a:fld>
             <a:endParaRPr lang="ru-RU"/>
           </a:p>
@@ -19434,9 +19434,9 @@
         <p:grpSpPr>
           <a:xfrm>
             <a:off x="378908" y="891874"/>
-            <a:ext cx="2142087" cy="704946"/>
+            <a:ext cx="2084379" cy="704946"/>
             <a:chOff x="867511" y="895299"/>
-            <a:chExt cx="2142087" cy="704946"/>
+            <a:chExt cx="2084379" cy="704946"/>
           </a:xfrm>
         </p:grpSpPr>
         <p:sp>
@@ -19519,7 +19519,7 @@
           <p:spPr>
             <a:xfrm>
               <a:off x="1342154" y="920362"/>
-              <a:ext cx="1667444" cy="646331"/>
+              <a:ext cx="1609736" cy="646331"/>
             </a:xfrm>
             <a:prstGeom prst="rect">
               <a:avLst/>
@@ -19540,7 +19540,7 @@
             <a:p>
               <a:r>
                 <a:rPr lang="ru-RU" dirty="0" smtClean="0"/>
-                <a:t>перехода</a:t>
+                <a:t>пользования</a:t>
               </a:r>
               <a:endParaRPr lang="ru-RU" dirty="0"/>
             </a:p>
@@ -19556,9 +19556,9 @@
         <p:grpSpPr>
           <a:xfrm>
             <a:off x="372485" y="1735376"/>
-            <a:ext cx="2034685" cy="704946"/>
+            <a:ext cx="2024978" cy="704946"/>
             <a:chOff x="867511" y="895299"/>
-            <a:chExt cx="2034685" cy="704946"/>
+            <a:chExt cx="2024978" cy="704946"/>
           </a:xfrm>
         </p:grpSpPr>
         <p:sp>
@@ -19641,7 +19641,7 @@
           <p:spPr>
             <a:xfrm>
               <a:off x="1342154" y="920362"/>
-              <a:ext cx="1560042" cy="646331"/>
+              <a:ext cx="1433406" cy="646331"/>
             </a:xfrm>
             <a:prstGeom prst="rect">
               <a:avLst/>
@@ -19656,8 +19656,9 @@
             <a:p>
               <a:r>
                 <a:rPr lang="ru-RU" dirty="0" smtClean="0"/>
-                <a:t>Возможность</a:t>
+                <a:t>Расширение</a:t>
               </a:r>
+              <a:endParaRPr lang="ru-RU" dirty="0" smtClean="0"/>
             </a:p>
             <a:p>
               <a:r>
@@ -19800,6 +19801,86 @@
           </p:txBody>
         </p:sp>
       </p:grpSp>
+      <p:sp>
+        <p:nvSpPr>
+          <p:cNvPr id="35" name="Овал 34"/>
+          <p:cNvSpPr/>
+          <p:nvPr/>
+        </p:nvSpPr>
+        <p:spPr>
+          <a:xfrm>
+            <a:off x="234851" y="3573029"/>
+            <a:ext cx="1080120" cy="967584"/>
+          </a:xfrm>
+          <a:prstGeom prst="ellipse">
+            <a:avLst/>
+          </a:prstGeom>
+        </p:spPr>
+        <p:style>
+          <a:lnRef idx="2">
+            <a:schemeClr val="accent1">
+              <a:shade val="50000"/>
+            </a:schemeClr>
+          </a:lnRef>
+          <a:fillRef idx="1">
+            <a:schemeClr val="accent1"/>
+          </a:fillRef>
+          <a:effectRef idx="0">
+            <a:schemeClr val="accent1"/>
+          </a:effectRef>
+          <a:fontRef idx="minor">
+            <a:schemeClr val="lt1"/>
+          </a:fontRef>
+        </p:style>
+        <p:txBody>
+          <a:bodyPr rtlCol="0" anchor="ctr"/>
+          <a:lstStyle/>
+          <a:p>
+            <a:pPr algn="ctr"/>
+            <a:r>
+              <a:rPr lang="en-US" dirty="0" smtClean="0"/>
+              <a:t>Edit Text</a:t>
+            </a:r>
+            <a:endParaRPr lang="ru-RU" dirty="0"/>
+          </a:p>
+        </p:txBody>
+      </p:sp>
+      <p:cxnSp>
+        <p:nvCxnSpPr>
+          <p:cNvPr id="5" name="Прямая со стрелкой 4"/>
+          <p:cNvCxnSpPr>
+            <a:stCxn id="11" idx="2"/>
+            <a:endCxn id="35" idx="6"/>
+          </p:cNvCxnSpPr>
+          <p:nvPr/>
+        </p:nvCxnSpPr>
+        <p:spPr>
+          <a:xfrm flipH="1" flipV="1">
+            <a:off x="1314971" y="4056821"/>
+            <a:ext cx="347260" cy="127318"/>
+          </a:xfrm>
+          <a:prstGeom prst="straightConnector1">
+            <a:avLst/>
+          </a:prstGeom>
+          <a:ln>
+            <a:tailEnd type="arrow"/>
+          </a:ln>
+        </p:spPr>
+        <p:style>
+          <a:lnRef idx="1">
+            <a:schemeClr val="accent1"/>
+          </a:lnRef>
+          <a:fillRef idx="0">
+            <a:schemeClr val="accent1"/>
+          </a:fillRef>
+          <a:effectRef idx="0">
+            <a:schemeClr val="accent1"/>
+          </a:effectRef>
+          <a:fontRef idx="minor">
+            <a:schemeClr val="tx1"/>
+          </a:fontRef>
+        </p:style>
+      </p:cxnSp>
     </p:spTree>
     <p:extLst>
       <p:ext uri="{BB962C8B-B14F-4D97-AF65-F5344CB8AC3E}">
@@ -20061,7 +20142,7 @@
         </p:nvSpPr>
         <p:spPr>
           <a:xfrm>
-            <a:off x="2339752" y="4365104"/>
+            <a:off x="2411760" y="4437112"/>
             <a:ext cx="1872208" cy="720080"/>
           </a:xfrm>
           <a:prstGeom prst="roundRect">
@@ -20109,7 +20190,7 @@
         <p:spPr>
           <a:xfrm rot="10800000">
             <a:off x="1943708" y="3901680"/>
-            <a:ext cx="396044" cy="823464"/>
+            <a:ext cx="468052" cy="895472"/>
           </a:xfrm>
           <a:prstGeom prst="bentConnector2">
             <a:avLst/>
@@ -20144,10 +20225,134 @@
         </p:nvCxnSpPr>
         <p:spPr>
           <a:xfrm flipV="1">
-            <a:off x="4211960" y="3541640"/>
-            <a:ext cx="371237" cy="1183504"/>
+            <a:off x="4283968" y="3541640"/>
+            <a:ext cx="299229" cy="1255512"/>
           </a:xfrm>
           <a:prstGeom prst="bentConnector2">
+            <a:avLst/>
+          </a:prstGeom>
+          <a:ln>
+            <a:tailEnd type="arrow"/>
+          </a:ln>
+        </p:spPr>
+        <p:style>
+          <a:lnRef idx="1">
+            <a:schemeClr val="accent1"/>
+          </a:lnRef>
+          <a:fillRef idx="0">
+            <a:schemeClr val="accent1"/>
+          </a:fillRef>
+          <a:effectRef idx="0">
+            <a:schemeClr val="accent1"/>
+          </a:effectRef>
+          <a:fontRef idx="minor">
+            <a:schemeClr val="tx1"/>
+          </a:fontRef>
+        </p:style>
+      </p:cxnSp>
+      <p:sp>
+        <p:nvSpPr>
+          <p:cNvPr id="9" name="Скругленный прямоугольник 8"/>
+          <p:cNvSpPr/>
+          <p:nvPr/>
+        </p:nvSpPr>
+        <p:spPr>
+          <a:xfrm>
+            <a:off x="5580112" y="4941168"/>
+            <a:ext cx="1872208" cy="720080"/>
+          </a:xfrm>
+          <a:prstGeom prst="roundRect">
+            <a:avLst/>
+          </a:prstGeom>
+        </p:spPr>
+        <p:style>
+          <a:lnRef idx="2">
+            <a:schemeClr val="accent1">
+              <a:shade val="50000"/>
+            </a:schemeClr>
+          </a:lnRef>
+          <a:fillRef idx="1">
+            <a:schemeClr val="accent1"/>
+          </a:fillRef>
+          <a:effectRef idx="0">
+            <a:schemeClr val="accent1"/>
+          </a:effectRef>
+          <a:fontRef idx="minor">
+            <a:schemeClr val="lt1"/>
+          </a:fontRef>
+        </p:style>
+        <p:txBody>
+          <a:bodyPr rtlCol="0" anchor="ctr"/>
+          <a:lstStyle/>
+          <a:p>
+            <a:pPr algn="ctr"/>
+            <a:r>
+              <a:rPr lang="en-US" dirty="0" err="1" smtClean="0"/>
+              <a:t>TextFragment</a:t>
+            </a:r>
+            <a:endParaRPr lang="en-US" dirty="0" smtClean="0"/>
+          </a:p>
+        </p:txBody>
+      </p:sp>
+      <p:sp>
+        <p:nvSpPr>
+          <p:cNvPr id="14" name="Скругленный прямоугольник 13"/>
+          <p:cNvSpPr/>
+          <p:nvPr/>
+        </p:nvSpPr>
+        <p:spPr>
+          <a:xfrm>
+            <a:off x="6287250" y="3449316"/>
+            <a:ext cx="1512168" cy="720080"/>
+          </a:xfrm>
+          <a:prstGeom prst="roundRect">
+            <a:avLst/>
+          </a:prstGeom>
+        </p:spPr>
+        <p:style>
+          <a:lnRef idx="2">
+            <a:schemeClr val="accent1">
+              <a:shade val="50000"/>
+            </a:schemeClr>
+          </a:lnRef>
+          <a:fillRef idx="1">
+            <a:schemeClr val="accent1"/>
+          </a:fillRef>
+          <a:effectRef idx="0">
+            <a:schemeClr val="accent1"/>
+          </a:effectRef>
+          <a:fontRef idx="minor">
+            <a:schemeClr val="lt1"/>
+          </a:fontRef>
+        </p:style>
+        <p:txBody>
+          <a:bodyPr rtlCol="0" anchor="ctr"/>
+          <a:lstStyle/>
+          <a:p>
+            <a:pPr algn="ctr"/>
+            <a:r>
+              <a:rPr lang="en-US" dirty="0" err="1" smtClean="0"/>
+              <a:t>SoundStore</a:t>
+            </a:r>
+            <a:endParaRPr lang="ru-RU" dirty="0"/>
+          </a:p>
+        </p:txBody>
+      </p:sp>
+      <p:cxnSp>
+        <p:nvCxnSpPr>
+          <p:cNvPr id="8" name="Соединительная линия уступом 7"/>
+          <p:cNvCxnSpPr>
+            <a:stCxn id="9" idx="0"/>
+            <a:endCxn id="14" idx="2"/>
+          </p:cNvCxnSpPr>
+          <p:nvPr/>
+        </p:nvCxnSpPr>
+        <p:spPr>
+          <a:xfrm rot="5400000" flipH="1" flipV="1">
+            <a:off x="6393889" y="4291723"/>
+            <a:ext cx="771772" cy="527118"/>
+          </a:xfrm>
+          <a:prstGeom prst="bentConnector3">
             <a:avLst/>
           </a:prstGeom>
           <a:ln>
@@ -20315,6 +20520,13 @@
             <a:r>
               <a:rPr lang="ru-RU" dirty="0" err="1" smtClean="0"/>
               <a:t>Видио</a:t>
+            </a:r>
+            <a:endParaRPr lang="en-US" dirty="0"/>
+          </a:p>
+          <a:p>
+            <a:r>
+              <a:rPr lang="en-US" dirty="0" smtClean="0"/>
+              <a:t>MP3</a:t>
             </a:r>
             <a:endParaRPr lang="ru-RU" dirty="0" smtClean="0"/>
           </a:p>

</xml_diff>